<commit_message>
Updated titles within presentation, added a slide about our initial correlations, and a cell showing a correlation pull for the subset of data
</commit_message>
<xml_diff>
--- a/Project1_Group4_Obesity&Temp.pptx
+++ b/Project1_Group4_Obesity&Temp.pptx
@@ -28,6 +28,7 @@
     <p:sldId id="273" r:id="rId25"/>
     <p:sldId id="274" r:id="rId26"/>
     <p:sldId id="275" r:id="rId27"/>
+    <p:sldId id="276" r:id="rId28"/>
   </p:sldIdLst>
   <p:sldSz cx="24384000" cy="13716000"/>
   <p:notesSz cx="6858000" cy="9144000"/>
@@ -599,7 +600,7 @@
       </p:grpSpPr>
       <p:sp>
         <p:nvSpPr>
-          <p:cNvPr id="205" name="Shape 205"/>
+          <p:cNvPr id="216" name="Shape 216"/>
           <p:cNvSpPr/>
           <p:nvPr>
             <p:ph type="sldImg"/>
@@ -620,7 +621,7 @@
       </p:sp>
       <p:sp>
         <p:nvSpPr>
-          <p:cNvPr id="206" name="Shape 206"/>
+          <p:cNvPr id="217" name="Shape 217"/>
           <p:cNvSpPr/>
           <p:nvPr>
             <p:ph type="body" sz="quarter" idx="1"/>
@@ -637,7 +638,7 @@
           <a:p>
             <a:pPr/>
             <a:r>
-              <a:t>Hena</a:t>
+              <a:t>Marina: Louisiana, Mississippi, Alabama, Arkansas, Oklahoma, South Carolina, North Carolina, Tennessee, Kentucky, and Missouri have above average obesity and temperatures</a:t>
             </a:r>
           </a:p>
         </p:txBody>
@@ -669,7 +670,7 @@
       </p:grpSpPr>
       <p:sp>
         <p:nvSpPr>
-          <p:cNvPr id="212" name="Shape 212"/>
+          <p:cNvPr id="222" name="Shape 222"/>
           <p:cNvSpPr/>
           <p:nvPr>
             <p:ph type="sldImg"/>
@@ -690,7 +691,7 @@
       </p:sp>
       <p:sp>
         <p:nvSpPr>
-          <p:cNvPr id="213" name="Shape 213"/>
+          <p:cNvPr id="223" name="Shape 223"/>
           <p:cNvSpPr/>
           <p:nvPr>
             <p:ph type="body" sz="quarter" idx="1"/>
@@ -739,7 +740,7 @@
       </p:grpSpPr>
       <p:sp>
         <p:nvSpPr>
-          <p:cNvPr id="236" name="Shape 236"/>
+          <p:cNvPr id="229" name="Shape 229"/>
           <p:cNvSpPr/>
           <p:nvPr>
             <p:ph type="sldImg"/>
@@ -760,7 +761,7 @@
       </p:sp>
       <p:sp>
         <p:nvSpPr>
-          <p:cNvPr id="237" name="Shape 237"/>
+          <p:cNvPr id="230" name="Shape 230"/>
           <p:cNvSpPr/>
           <p:nvPr>
             <p:ph type="body" sz="quarter" idx="1"/>
@@ -777,7 +778,7 @@
           <a:p>
             <a:pPr/>
             <a:r>
-              <a:t>Becca</a:t>
+              <a:t>Hena</a:t>
             </a:r>
           </a:p>
         </p:txBody>
@@ -809,7 +810,7 @@
       </p:grpSpPr>
       <p:sp>
         <p:nvSpPr>
-          <p:cNvPr id="243" name="Shape 243"/>
+          <p:cNvPr id="253" name="Shape 253"/>
           <p:cNvSpPr/>
           <p:nvPr>
             <p:ph type="sldImg"/>
@@ -830,7 +831,7 @@
       </p:sp>
       <p:sp>
         <p:nvSpPr>
-          <p:cNvPr id="244" name="Shape 244"/>
+          <p:cNvPr id="254" name="Shape 254"/>
           <p:cNvSpPr/>
           <p:nvPr>
             <p:ph type="body" sz="quarter" idx="1"/>
@@ -879,7 +880,7 @@
       </p:grpSpPr>
       <p:sp>
         <p:nvSpPr>
-          <p:cNvPr id="254" name="Shape 254"/>
+          <p:cNvPr id="260" name="Shape 260"/>
           <p:cNvSpPr/>
           <p:nvPr>
             <p:ph type="sldImg"/>
@@ -900,7 +901,7 @@
       </p:sp>
       <p:sp>
         <p:nvSpPr>
-          <p:cNvPr id="255" name="Shape 255"/>
+          <p:cNvPr id="261" name="Shape 261"/>
           <p:cNvSpPr/>
           <p:nvPr>
             <p:ph type="body" sz="quarter" idx="1"/>
@@ -917,7 +918,7 @@
           <a:p>
             <a:pPr/>
             <a:r>
-              <a:t>Sabir</a:t>
+              <a:t>Becca</a:t>
             </a:r>
           </a:p>
         </p:txBody>
@@ -949,7 +950,7 @@
       </p:grpSpPr>
       <p:sp>
         <p:nvSpPr>
-          <p:cNvPr id="259" name="Shape 259"/>
+          <p:cNvPr id="271" name="Shape 271"/>
           <p:cNvSpPr/>
           <p:nvPr>
             <p:ph type="sldImg"/>
@@ -970,7 +971,7 @@
       </p:sp>
       <p:sp>
         <p:nvSpPr>
-          <p:cNvPr id="260" name="Shape 260"/>
+          <p:cNvPr id="272" name="Shape 272"/>
           <p:cNvSpPr/>
           <p:nvPr>
             <p:ph type="body" sz="quarter" idx="1"/>
@@ -1019,7 +1020,7 @@
       </p:grpSpPr>
       <p:sp>
         <p:nvSpPr>
-          <p:cNvPr id="264" name="Shape 264"/>
+          <p:cNvPr id="276" name="Shape 276"/>
           <p:cNvSpPr/>
           <p:nvPr>
             <p:ph type="sldImg"/>
@@ -1040,7 +1041,77 @@
       </p:sp>
       <p:sp>
         <p:nvSpPr>
-          <p:cNvPr id="265" name="Shape 265"/>
+          <p:cNvPr id="277" name="Shape 277"/>
+          <p:cNvSpPr/>
+          <p:nvPr>
+            <p:ph type="body" sz="quarter" idx="1"/>
+          </p:nvPr>
+        </p:nvSpPr>
+        <p:spPr>
+          <a:prstGeom prst="rect">
+            <a:avLst/>
+          </a:prstGeom>
+        </p:spPr>
+        <p:txBody>
+          <a:bodyPr/>
+          <a:lstStyle/>
+          <a:p>
+            <a:pPr/>
+            <a:r>
+              <a:t>Sabir</a:t>
+            </a:r>
+          </a:p>
+        </p:txBody>
+      </p:sp>
+    </p:spTree>
+  </p:cSld>
+  <p:clrMapOvr>
+    <a:masterClrMapping/>
+  </p:clrMapOvr>
+</p:notes>
+</file>
+
+<file path=ppt/notesSlides/notesSlide17.xml><?xml version="1.0" encoding="utf-8"?>
+<p:notes xmlns:a="http://schemas.openxmlformats.org/drawingml/2006/main" xmlns:r="http://schemas.openxmlformats.org/officeDocument/2006/relationships" xmlns:p="http://schemas.openxmlformats.org/presentationml/2006/main" xmlns:m="http://schemas.openxmlformats.org/officeDocument/2006/math" xmlns:a14="http://schemas.microsoft.com/office/drawing/2010/main" showMasterSp="1" showMasterPhAnim="1">
+  <p:cSld>
+    <p:spTree>
+      <p:nvGrpSpPr>
+        <p:cNvPr id="1" name=""/>
+        <p:cNvGrpSpPr/>
+        <p:nvPr/>
+      </p:nvGrpSpPr>
+      <p:grpSpPr>
+        <a:xfrm>
+          <a:off x="0" y="0"/>
+          <a:ext cx="0" cy="0"/>
+          <a:chOff x="0" y="0"/>
+          <a:chExt cx="0" cy="0"/>
+        </a:xfrm>
+      </p:grpSpPr>
+      <p:sp>
+        <p:nvSpPr>
+          <p:cNvPr id="281" name="Shape 281"/>
+          <p:cNvSpPr/>
+          <p:nvPr>
+            <p:ph type="sldImg"/>
+          </p:nvPr>
+        </p:nvSpPr>
+        <p:spPr>
+          <a:prstGeom prst="rect">
+            <a:avLst/>
+          </a:prstGeom>
+        </p:spPr>
+        <p:txBody>
+          <a:bodyPr/>
+          <a:lstStyle/>
+          <a:p>
+            <a:pPr/>
+          </a:p>
+        </p:txBody>
+      </p:sp>
+      <p:sp>
+        <p:nvSpPr>
+          <p:cNvPr id="282" name="Shape 282"/>
           <p:cNvSpPr/>
           <p:nvPr>
             <p:ph type="body" sz="quarter" idx="1"/>
@@ -4567,7 +4638,7 @@
       </p:grpSpPr>
       <p:sp>
         <p:nvSpPr>
-          <p:cNvPr id="196" name="Initial Findings"/>
+          <p:cNvPr id="196" name="Initial Comparison"/>
           <p:cNvSpPr txBox="1"/>
           <p:nvPr/>
         </p:nvSpPr>
@@ -4608,7 +4679,7 @@
           <a:p>
             <a:pPr/>
             <a:r>
-              <a:t>Initial Findings</a:t>
+              <a:t>Initial Comparison</a:t>
             </a:r>
           </a:p>
         </p:txBody>
@@ -4700,7 +4771,7 @@
       </p:grpSpPr>
       <p:sp>
         <p:nvSpPr>
-          <p:cNvPr id="202" name="Initial Findings"/>
+          <p:cNvPr id="202" name="Exploring Obesity Data Set"/>
           <p:cNvSpPr txBox="1"/>
           <p:nvPr/>
         </p:nvSpPr>
@@ -4741,74 +4812,14 @@
           <a:p>
             <a:pPr/>
             <a:r>
-              <a:t>Initial Findings</a:t>
-            </a:r>
-          </a:p>
-        </p:txBody>
-      </p:sp>
-      <p:sp>
-        <p:nvSpPr>
-          <p:cNvPr id="203" name="Statistic=11.554393289970982 and pvalue=2.6714108531690735e-75"/>
-          <p:cNvSpPr txBox="1"/>
-          <p:nvPr/>
-        </p:nvSpPr>
-        <p:spPr>
-          <a:xfrm>
-            <a:off x="1363982" y="2351459"/>
-            <a:ext cx="20909835" cy="1443882"/>
-          </a:xfrm>
-          <a:prstGeom prst="rect">
-            <a:avLst/>
-          </a:prstGeom>
-          <a:ln w="76200">
-            <a:solidFill>
-              <a:srgbClr val="FFFFFF">
-                <a:alpha val="66899"/>
-              </a:srgbClr>
-            </a:solidFill>
-            <a:miter lim="400000"/>
-          </a:ln>
-          <a:extLst>
-            <a:ext uri="{C572A759-6A51-4108-AA02-DFA0A04FC94B}">
-              <ma14:wrappingTextBoxFlag xmlns:ma14="http://schemas.microsoft.com/office/mac/drawingml/2011/main" val="1"/>
-            </a:ext>
-          </a:extLst>
-        </p:spPr>
-        <p:txBody>
-          <a:bodyPr lIns="50800" tIns="50800" rIns="50800" bIns="50800" anchor="ctr">
-            <a:spAutoFit/>
-          </a:bodyPr>
-          <a:lstStyle/>
-          <a:p>
-            <a:pPr algn="l">
-              <a:defRPr b="0" sz="4000">
-                <a:latin typeface="Arial Black"/>
-                <a:ea typeface="Arial Black"/>
-                <a:cs typeface="Arial Black"/>
-                <a:sym typeface="Arial Black"/>
-              </a:defRPr>
-            </a:pPr>
-          </a:p>
-          <a:p>
-            <a:pPr marL="529166" indent="-529166" algn="l">
-              <a:buSzPct val="125000"/>
-              <a:buChar char="•"/>
-              <a:defRPr b="0" sz="4000">
-                <a:latin typeface="Arial"/>
-                <a:ea typeface="Arial"/>
-                <a:cs typeface="Arial"/>
-                <a:sym typeface="Arial"/>
-              </a:defRPr>
-            </a:pPr>
-            <a:r>
-              <a:t>Statistic=11.554393289970982 and pvalue=2.6714108531690735e-75</a:t>
+              <a:t>Exploring Obesity Data Set</a:t>
             </a:r>
           </a:p>
         </p:txBody>
       </p:sp>
       <p:pic>
         <p:nvPicPr>
-          <p:cNvPr id="204" name="Statepop_BMI_boxplot.png" descr="Statepop_BMI_boxplot.png"/>
+          <p:cNvPr id="203" name="Screen Shot 2019-10-09 at 1.38.02 PM.png" descr="Screen Shot 2019-10-09 at 1.38.02 PM.png"/>
           <p:cNvPicPr>
             <a:picLocks noChangeAspect="1"/>
           </p:cNvPicPr>
@@ -4818,22 +4829,379 @@
           <a:blip r:embed="rId3">
             <a:extLst/>
           </a:blip>
-          <a:srcRect l="0" t="6312" r="0" b="0"/>
+          <a:srcRect l="0" t="0" r="9179" b="0"/>
           <a:stretch>
             <a:fillRect/>
           </a:stretch>
         </p:blipFill>
         <p:spPr>
           <a:xfrm>
-            <a:off x="1585515" y="4019111"/>
-            <a:ext cx="21213052" cy="9936999"/>
+            <a:off x="812799" y="3844765"/>
+            <a:ext cx="12619173" cy="8838176"/>
           </a:xfrm>
           <a:prstGeom prst="rect">
             <a:avLst/>
           </a:prstGeom>
+          <a:ln w="25400">
+            <a:solidFill>
+              <a:srgbClr val="F3F7F5"/>
+            </a:solidFill>
+            <a:miter lim="400000"/>
+          </a:ln>
+          <a:effectLst>
+            <a:outerShdw sx="100000" sy="100000" kx="0" ky="0" algn="b" rotWithShape="0" blurRad="50800" dist="25400" dir="3600000">
+              <a:srgbClr val="000000">
+                <a:alpha val="70000"/>
+              </a:srgbClr>
+            </a:outerShdw>
+          </a:effectLst>
+        </p:spPr>
+      </p:pic>
+      <p:sp>
+        <p:nvSpPr>
+          <p:cNvPr id="204" name="Cleaned Subset"/>
+          <p:cNvSpPr txBox="1"/>
+          <p:nvPr/>
+        </p:nvSpPr>
+        <p:spPr>
+          <a:xfrm>
+            <a:off x="16746497" y="4623342"/>
+            <a:ext cx="6636423" cy="660401"/>
+          </a:xfrm>
+          <a:prstGeom prst="rect">
+            <a:avLst/>
+          </a:prstGeom>
+          <a:solidFill>
+            <a:srgbClr val="FFFFFF"/>
+          </a:solidFill>
           <a:ln w="12700">
             <a:miter lim="400000"/>
           </a:ln>
+          <a:extLst>
+            <a:ext uri="{C572A759-6A51-4108-AA02-DFA0A04FC94B}">
+              <ma14:wrappingTextBoxFlag xmlns:ma14="http://schemas.microsoft.com/office/mac/drawingml/2011/main" val="1"/>
+            </a:ext>
+          </a:extLst>
+        </p:spPr>
+        <p:txBody>
+          <a:bodyPr lIns="50800" tIns="50800" rIns="50800" bIns="50800" anchor="ctr">
+            <a:spAutoFit/>
+          </a:bodyPr>
+          <a:lstStyle>
+            <a:lvl1pPr>
+              <a:defRPr b="0" cap="all" sz="3700">
+                <a:solidFill>
+                  <a:srgbClr val="5E5E5E"/>
+                </a:solidFill>
+                <a:latin typeface="Times"/>
+                <a:ea typeface="Times"/>
+                <a:cs typeface="Times"/>
+                <a:sym typeface="Times"/>
+              </a:defRPr>
+            </a:lvl1pPr>
+          </a:lstStyle>
+          <a:p>
+            <a:pPr/>
+            <a:r>
+              <a:t>Cleaned Subset</a:t>
+            </a:r>
+          </a:p>
+        </p:txBody>
+      </p:sp>
+      <p:sp>
+        <p:nvSpPr>
+          <p:cNvPr id="205" name="Rectangle"/>
+          <p:cNvSpPr/>
+          <p:nvPr/>
+        </p:nvSpPr>
+        <p:spPr>
+          <a:xfrm>
+            <a:off x="7747431" y="4796929"/>
+            <a:ext cx="1034877" cy="349149"/>
+          </a:xfrm>
+          <a:prstGeom prst="rect">
+            <a:avLst/>
+          </a:prstGeom>
+          <a:solidFill>
+            <a:schemeClr val="accent4">
+              <a:hueOff val="-461056"/>
+              <a:satOff val="4338"/>
+              <a:lumOff val="-10225"/>
+              <a:alpha val="45924"/>
+            </a:schemeClr>
+          </a:solidFill>
+          <a:ln w="12700">
+            <a:miter lim="400000"/>
+          </a:ln>
+        </p:spPr>
+        <p:txBody>
+          <a:bodyPr lIns="0" tIns="0" rIns="0" bIns="0" anchor="ctr"/>
+          <a:lstStyle/>
+          <a:p>
+            <a:pPr>
+              <a:defRPr b="0" sz="3200">
+                <a:solidFill>
+                  <a:srgbClr val="FFFFFF"/>
+                </a:solidFill>
+                <a:latin typeface="+mn-lt"/>
+                <a:ea typeface="+mn-ea"/>
+                <a:cs typeface="+mn-cs"/>
+                <a:sym typeface="Helvetica Neue Medium"/>
+              </a:defRPr>
+            </a:pPr>
+          </a:p>
+        </p:txBody>
+      </p:sp>
+      <p:sp>
+        <p:nvSpPr>
+          <p:cNvPr id="206" name="Initial Testing"/>
+          <p:cNvSpPr txBox="1"/>
+          <p:nvPr/>
+        </p:nvSpPr>
+        <p:spPr>
+          <a:xfrm>
+            <a:off x="4946658" y="2899230"/>
+            <a:ext cx="6636423" cy="660401"/>
+          </a:xfrm>
+          <a:prstGeom prst="rect">
+            <a:avLst/>
+          </a:prstGeom>
+          <a:solidFill>
+            <a:srgbClr val="FFFFFF"/>
+          </a:solidFill>
+          <a:ln w="12700">
+            <a:miter lim="400000"/>
+          </a:ln>
+          <a:extLst>
+            <a:ext uri="{C572A759-6A51-4108-AA02-DFA0A04FC94B}">
+              <ma14:wrappingTextBoxFlag xmlns:ma14="http://schemas.microsoft.com/office/mac/drawingml/2011/main" val="1"/>
+            </a:ext>
+          </a:extLst>
+        </p:spPr>
+        <p:txBody>
+          <a:bodyPr lIns="50800" tIns="50800" rIns="50800" bIns="50800" anchor="ctr">
+            <a:spAutoFit/>
+          </a:bodyPr>
+          <a:lstStyle>
+            <a:lvl1pPr>
+              <a:defRPr b="0" cap="all" sz="3700">
+                <a:solidFill>
+                  <a:srgbClr val="5E5E5E"/>
+                </a:solidFill>
+                <a:latin typeface="Times"/>
+                <a:ea typeface="Times"/>
+                <a:cs typeface="Times"/>
+                <a:sym typeface="Times"/>
+              </a:defRPr>
+            </a:lvl1pPr>
+          </a:lstStyle>
+          <a:p>
+            <a:pPr/>
+            <a:r>
+              <a:t>Initial Testing</a:t>
+            </a:r>
+          </a:p>
+        </p:txBody>
+      </p:sp>
+      <p:pic>
+        <p:nvPicPr>
+          <p:cNvPr id="207" name="Screen Shot 2019-10-09 at 1.37.25 PM.png" descr="Screen Shot 2019-10-09 at 1.37.25 PM.png"/>
+          <p:cNvPicPr>
+            <a:picLocks noChangeAspect="1"/>
+          </p:cNvPicPr>
+          <p:nvPr/>
+        </p:nvPicPr>
+        <p:blipFill>
+          <a:blip r:embed="rId4">
+            <a:extLst/>
+          </a:blip>
+          <a:stretch>
+            <a:fillRect/>
+          </a:stretch>
+        </p:blipFill>
+        <p:spPr>
+          <a:xfrm>
+            <a:off x="15804352" y="5627917"/>
+            <a:ext cx="7794971" cy="3019674"/>
+          </a:xfrm>
+          <a:prstGeom prst="rect">
+            <a:avLst/>
+          </a:prstGeom>
+          <a:ln w="25400">
+            <a:solidFill>
+              <a:srgbClr val="F3F7F5"/>
+            </a:solidFill>
+            <a:miter lim="400000"/>
+          </a:ln>
+          <a:effectLst>
+            <a:outerShdw sx="100000" sy="100000" kx="0" ky="0" algn="b" rotWithShape="0" blurRad="50800" dist="25400" dir="3600000">
+              <a:srgbClr val="000000">
+                <a:alpha val="70000"/>
+              </a:srgbClr>
+            </a:outerShdw>
+          </a:effectLst>
+        </p:spPr>
+      </p:pic>
+      <p:sp>
+        <p:nvSpPr>
+          <p:cNvPr id="208" name="Rectangle"/>
+          <p:cNvSpPr/>
+          <p:nvPr/>
+        </p:nvSpPr>
+        <p:spPr>
+          <a:xfrm>
+            <a:off x="12142179" y="4796929"/>
+            <a:ext cx="1222910" cy="349149"/>
+          </a:xfrm>
+          <a:prstGeom prst="rect">
+            <a:avLst/>
+          </a:prstGeom>
+          <a:solidFill>
+            <a:schemeClr val="accent4">
+              <a:hueOff val="-461056"/>
+              <a:satOff val="4338"/>
+              <a:lumOff val="-10225"/>
+              <a:alpha val="45924"/>
+            </a:schemeClr>
+          </a:solidFill>
+          <a:ln w="12700">
+            <a:miter lim="400000"/>
+          </a:ln>
+        </p:spPr>
+        <p:txBody>
+          <a:bodyPr lIns="0" tIns="0" rIns="0" bIns="0" anchor="ctr"/>
+          <a:lstStyle/>
+          <a:p>
+            <a:pPr>
+              <a:defRPr b="0" sz="3200">
+                <a:solidFill>
+                  <a:srgbClr val="FFFFFF"/>
+                </a:solidFill>
+                <a:latin typeface="+mn-lt"/>
+                <a:ea typeface="+mn-ea"/>
+                <a:cs typeface="+mn-cs"/>
+                <a:sym typeface="Helvetica Neue Medium"/>
+              </a:defRPr>
+            </a:pPr>
+          </a:p>
+        </p:txBody>
+      </p:sp>
+      <p:sp>
+        <p:nvSpPr>
+          <p:cNvPr id="209" name="Line"/>
+          <p:cNvSpPr/>
+          <p:nvPr/>
+        </p:nvSpPr>
+        <p:spPr>
+          <a:xfrm>
+            <a:off x="14198302" y="7422830"/>
+            <a:ext cx="852287" cy="1"/>
+          </a:xfrm>
+          <a:prstGeom prst="line">
+            <a:avLst/>
+          </a:prstGeom>
+          <a:ln w="50800">
+            <a:solidFill>
+              <a:srgbClr val="000000"/>
+            </a:solidFill>
+            <a:miter lim="400000"/>
+            <a:tailEnd type="triangle"/>
+          </a:ln>
+        </p:spPr>
+        <p:txBody>
+          <a:bodyPr lIns="0" tIns="0" rIns="0" bIns="0" anchor="ctr"/>
+          <a:lstStyle/>
+          <a:p>
+            <a:pPr>
+              <a:defRPr b="0" sz="3200">
+                <a:solidFill>
+                  <a:srgbClr val="FFFFFF"/>
+                </a:solidFill>
+                <a:latin typeface="+mn-lt"/>
+                <a:ea typeface="+mn-ea"/>
+                <a:cs typeface="+mn-cs"/>
+                <a:sym typeface="Helvetica Neue Medium"/>
+              </a:defRPr>
+            </a:pPr>
+          </a:p>
+        </p:txBody>
+      </p:sp>
+      <p:pic>
+        <p:nvPicPr>
+          <p:cNvPr id="210" name="Oval Oval" descr="Oval Oval"/>
+          <p:cNvPicPr>
+            <a:picLocks noChangeAspect="0"/>
+          </p:cNvPicPr>
+          <p:nvPr/>
+        </p:nvPicPr>
+        <p:blipFill>
+          <a:blip r:embed="rId5">
+            <a:extLst/>
+          </a:blip>
+          <a:stretch>
+            <a:fillRect/>
+          </a:stretch>
+        </p:blipFill>
+        <p:spPr>
+          <a:xfrm>
+            <a:off x="12172812" y="8101895"/>
+            <a:ext cx="1535194" cy="349149"/>
+          </a:xfrm>
+          <a:prstGeom prst="rect">
+            <a:avLst/>
+          </a:prstGeom>
+        </p:spPr>
+      </p:pic>
+      <p:pic>
+        <p:nvPicPr>
+          <p:cNvPr id="212" name="Oval Oval" descr="Oval Oval"/>
+          <p:cNvPicPr>
+            <a:picLocks noChangeAspect="0"/>
+          </p:cNvPicPr>
+          <p:nvPr/>
+        </p:nvPicPr>
+        <p:blipFill>
+          <a:blip r:embed="rId6">
+            <a:extLst/>
+          </a:blip>
+          <a:stretch>
+            <a:fillRect/>
+          </a:stretch>
+        </p:blipFill>
+        <p:spPr>
+          <a:xfrm>
+            <a:off x="7522673" y="8101895"/>
+            <a:ext cx="1535194" cy="349149"/>
+          </a:xfrm>
+          <a:prstGeom prst="rect">
+            <a:avLst/>
+          </a:prstGeom>
+        </p:spPr>
+      </p:pic>
+      <p:pic>
+        <p:nvPicPr>
+          <p:cNvPr id="214" name="Oval Oval" descr="Oval Oval"/>
+          <p:cNvPicPr>
+            <a:picLocks noChangeAspect="0"/>
+          </p:cNvPicPr>
+          <p:nvPr/>
+        </p:nvPicPr>
+        <p:blipFill>
+          <a:blip r:embed="rId7">
+            <a:extLst/>
+          </a:blip>
+          <a:stretch>
+            <a:fillRect/>
+          </a:stretch>
+        </p:blipFill>
+        <p:spPr>
+          <a:xfrm>
+            <a:off x="18634463" y="7635926"/>
+            <a:ext cx="5161272" cy="563358"/>
+          </a:xfrm>
+          <a:prstGeom prst="rect">
+            <a:avLst/>
+          </a:prstGeom>
         </p:spPr>
       </p:pic>
     </p:spTree>
@@ -4864,7 +5232,7 @@
       </p:grpSpPr>
       <p:sp>
         <p:nvSpPr>
-          <p:cNvPr id="208" name="Initial Findings"/>
+          <p:cNvPr id="219" name="Obesity by State Boxplot"/>
           <p:cNvSpPr txBox="1"/>
           <p:nvPr/>
         </p:nvSpPr>
@@ -4905,14 +5273,178 @@
           <a:p>
             <a:pPr/>
             <a:r>
-              <a:t>Initial Findings</a:t>
+              <a:t>Obesity by State Boxplot</a:t>
             </a:r>
           </a:p>
         </p:txBody>
       </p:sp>
       <p:sp>
         <p:nvSpPr>
-          <p:cNvPr id="209" name="We cannot prove a significant difference in the obesity means by population of each state"/>
+          <p:cNvPr id="220" name="Statistic=11.554393289970982 and pvalue=2.6714108531690735e-75"/>
+          <p:cNvSpPr txBox="1"/>
+          <p:nvPr/>
+        </p:nvSpPr>
+        <p:spPr>
+          <a:xfrm>
+            <a:off x="1363982" y="2351459"/>
+            <a:ext cx="20909835" cy="1443882"/>
+          </a:xfrm>
+          <a:prstGeom prst="rect">
+            <a:avLst/>
+          </a:prstGeom>
+          <a:ln w="76200">
+            <a:solidFill>
+              <a:srgbClr val="FFFFFF">
+                <a:alpha val="66899"/>
+              </a:srgbClr>
+            </a:solidFill>
+            <a:miter lim="400000"/>
+          </a:ln>
+          <a:extLst>
+            <a:ext uri="{C572A759-6A51-4108-AA02-DFA0A04FC94B}">
+              <ma14:wrappingTextBoxFlag xmlns:ma14="http://schemas.microsoft.com/office/mac/drawingml/2011/main" val="1"/>
+            </a:ext>
+          </a:extLst>
+        </p:spPr>
+        <p:txBody>
+          <a:bodyPr lIns="50800" tIns="50800" rIns="50800" bIns="50800" anchor="ctr">
+            <a:spAutoFit/>
+          </a:bodyPr>
+          <a:lstStyle/>
+          <a:p>
+            <a:pPr algn="l">
+              <a:defRPr b="0" sz="4000">
+                <a:latin typeface="Arial Black"/>
+                <a:ea typeface="Arial Black"/>
+                <a:cs typeface="Arial Black"/>
+                <a:sym typeface="Arial Black"/>
+              </a:defRPr>
+            </a:pPr>
+          </a:p>
+          <a:p>
+            <a:pPr marL="529166" indent="-529166" algn="l">
+              <a:buSzPct val="125000"/>
+              <a:buChar char="•"/>
+              <a:defRPr b="0" sz="4000">
+                <a:latin typeface="Arial"/>
+                <a:ea typeface="Arial"/>
+                <a:cs typeface="Arial"/>
+                <a:sym typeface="Arial"/>
+              </a:defRPr>
+            </a:pPr>
+            <a:r>
+              <a:t>Statistic=11.554393289970982 and pvalue=2.6714108531690735e-75</a:t>
+            </a:r>
+          </a:p>
+        </p:txBody>
+      </p:sp>
+      <p:pic>
+        <p:nvPicPr>
+          <p:cNvPr id="221" name="Statepop_BMI_boxplot.png" descr="Statepop_BMI_boxplot.png"/>
+          <p:cNvPicPr>
+            <a:picLocks noChangeAspect="1"/>
+          </p:cNvPicPr>
+          <p:nvPr/>
+        </p:nvPicPr>
+        <p:blipFill>
+          <a:blip r:embed="rId3">
+            <a:extLst/>
+          </a:blip>
+          <a:srcRect l="0" t="6312" r="0" b="0"/>
+          <a:stretch>
+            <a:fillRect/>
+          </a:stretch>
+        </p:blipFill>
+        <p:spPr>
+          <a:xfrm>
+            <a:off x="1585515" y="4019111"/>
+            <a:ext cx="21213052" cy="9936999"/>
+          </a:xfrm>
+          <a:prstGeom prst="rect">
+            <a:avLst/>
+          </a:prstGeom>
+          <a:ln w="12700">
+            <a:miter lim="400000"/>
+          </a:ln>
+        </p:spPr>
+      </p:pic>
+    </p:spTree>
+  </p:cSld>
+  <p:clrMapOvr>
+    <a:masterClrMapping/>
+  </p:clrMapOvr>
+  <p:transition xmlns:p14="http://schemas.microsoft.com/office/powerpoint/2010/main" spd="med" advClick="1"/>
+</p:sld>
+</file>
+
+<file path=ppt/slides/slide14.xml><?xml version="1.0" encoding="utf-8"?>
+<p:sld xmlns:a="http://schemas.openxmlformats.org/drawingml/2006/main" xmlns:r="http://schemas.openxmlformats.org/officeDocument/2006/relationships" xmlns:p="http://schemas.openxmlformats.org/presentationml/2006/main" xmlns:m="http://schemas.openxmlformats.org/officeDocument/2006/math" xmlns:a14="http://schemas.microsoft.com/office/drawing/2010/main" showMasterSp="1" showMasterPhAnim="1">
+  <p:cSld>
+    <p:spTree>
+      <p:nvGrpSpPr>
+        <p:cNvPr id="1" name=""/>
+        <p:cNvGrpSpPr/>
+        <p:nvPr/>
+      </p:nvGrpSpPr>
+      <p:grpSpPr>
+        <a:xfrm>
+          <a:off x="0" y="0"/>
+          <a:ext cx="0" cy="0"/>
+          <a:chOff x="0" y="0"/>
+          <a:chExt cx="0" cy="0"/>
+        </a:xfrm>
+      </p:grpSpPr>
+      <p:sp>
+        <p:nvSpPr>
+          <p:cNvPr id="225" name="Temperature and Obesity plots"/>
+          <p:cNvSpPr txBox="1"/>
+          <p:nvPr/>
+        </p:nvSpPr>
+        <p:spPr>
+          <a:xfrm>
+            <a:off x="516408" y="760232"/>
+            <a:ext cx="11088766" cy="901701"/>
+          </a:xfrm>
+          <a:prstGeom prst="rect">
+            <a:avLst/>
+          </a:prstGeom>
+          <a:solidFill>
+            <a:srgbClr val="FFFFFF"/>
+          </a:solidFill>
+          <a:ln w="12700">
+            <a:miter lim="400000"/>
+          </a:ln>
+          <a:extLst>
+            <a:ext uri="{C572A759-6A51-4108-AA02-DFA0A04FC94B}">
+              <ma14:wrappingTextBoxFlag xmlns:ma14="http://schemas.microsoft.com/office/mac/drawingml/2011/main" val="1"/>
+            </a:ext>
+          </a:extLst>
+        </p:spPr>
+        <p:txBody>
+          <a:bodyPr lIns="50800" tIns="50800" rIns="50800" bIns="50800" anchor="ctr">
+            <a:spAutoFit/>
+          </a:bodyPr>
+          <a:lstStyle>
+            <a:lvl1pPr algn="l">
+              <a:defRPr cap="all" sz="5500">
+                <a:latin typeface="Arial Narrow"/>
+                <a:ea typeface="Arial Narrow"/>
+                <a:cs typeface="Arial Narrow"/>
+                <a:sym typeface="Arial Narrow"/>
+              </a:defRPr>
+            </a:lvl1pPr>
+          </a:lstStyle>
+          <a:p>
+            <a:pPr/>
+            <a:r>
+              <a:t>Temperature and Obesity plots</a:t>
+            </a:r>
+          </a:p>
+        </p:txBody>
+      </p:sp>
+      <p:sp>
+        <p:nvSpPr>
+          <p:cNvPr id="226" name="We cannot prove a significant difference in the obesity means by population of each state"/>
           <p:cNvSpPr txBox="1"/>
           <p:nvPr/>
         </p:nvSpPr>
@@ -4964,7 +5496,7 @@
       </p:sp>
       <p:pic>
         <p:nvPicPr>
-          <p:cNvPr id="210" name="Linear Regression of Mean Obesity vs Temperature by state.png" descr="Linear Regression of Mean Obesity vs Temperature by state.png"/>
+          <p:cNvPr id="227" name="Linear Regression of Mean Obesity vs Temperature by state.png" descr="Linear Regression of Mean Obesity vs Temperature by state.png"/>
           <p:cNvPicPr>
             <a:picLocks noChangeAspect="1"/>
           </p:cNvPicPr>
@@ -4993,7 +5525,7 @@
       </p:pic>
       <p:pic>
         <p:nvPicPr>
-          <p:cNvPr id="211" name="Scatter Plot of Mean Obesity vs Temperature by state.png" descr="Scatter Plot of Mean Obesity vs Temperature by state.png"/>
+          <p:cNvPr id="228" name="Scatter Plot of Mean Obesity vs Temperature by state.png" descr="Scatter Plot of Mean Obesity vs Temperature by state.png"/>
           <p:cNvPicPr>
             <a:picLocks noChangeAspect="1"/>
           </p:cNvPicPr>
@@ -5059,7 +5591,7 @@
                                       <p:cBhvr>
                                         <p:cTn id="6" fill="hold"/>
                                         <p:tgtEl>
-                                          <p:spTgt spid="209"/>
+                                          <p:spTgt spid="226"/>
                                         </p:tgtEl>
                                         <p:attrNameLst>
                                           <p:attrName>style.visibility</p:attrName>
@@ -5073,7 +5605,7 @@
                                       <p:cBhvr>
                                         <p:cTn id="7" dur="1500"/>
                                         <p:tgtEl>
-                                          <p:spTgt spid="209"/>
+                                          <p:spTgt spid="226"/>
                                         </p:tgtEl>
                                       </p:cBhvr>
                                     </p:animEffect>
@@ -5108,13 +5640,13 @@
       </p:par>
     </p:tnLst>
     <p:bldLst>
-      <p:bldP build="whole" bldLvl="1" animBg="1" rev="0" advAuto="0" spid="209" grpId="1"/>
+      <p:bldP build="whole" bldLvl="1" animBg="1" rev="0" advAuto="0" spid="226" grpId="1"/>
     </p:bldLst>
   </p:timing>
 </p:sld>
 </file>
 
-<file path=ppt/slides/slide14.xml><?xml version="1.0" encoding="utf-8"?>
+<file path=ppt/slides/slide15.xml><?xml version="1.0" encoding="utf-8"?>
 <p:sld xmlns:a="http://schemas.openxmlformats.org/drawingml/2006/main" xmlns:r="http://schemas.openxmlformats.org/officeDocument/2006/relationships" xmlns:p="http://schemas.openxmlformats.org/presentationml/2006/main" xmlns:m="http://schemas.openxmlformats.org/officeDocument/2006/math" xmlns:a14="http://schemas.microsoft.com/office/drawing/2010/main" showMasterSp="1" showMasterPhAnim="1">
   <p:cSld>
     <p:spTree>
@@ -5133,7 +5665,7 @@
       </p:grpSpPr>
       <p:pic>
         <p:nvPicPr>
-          <p:cNvPr id="215" name="Screen Shot 2019-10-09 at 12.30.35 PM.png" descr="Screen Shot 2019-10-09 at 12.30.35 PM.png"/>
+          <p:cNvPr id="232" name="Screen Shot 2019-10-09 at 12.30.35 PM.png" descr="Screen Shot 2019-10-09 at 12.30.35 PM.png"/>
           <p:cNvPicPr>
             <a:picLocks noChangeAspect="1"/>
           </p:cNvPicPr>
@@ -5163,7 +5695,7 @@
       </p:pic>
       <p:grpSp>
         <p:nvGrpSpPr>
-          <p:cNvPr id="218" name="Group"/>
+          <p:cNvPr id="235" name="Group"/>
           <p:cNvGrpSpPr/>
           <p:nvPr/>
         </p:nvGrpSpPr>
@@ -5177,7 +5709,7 @@
         </p:grpSpPr>
         <p:pic>
           <p:nvPicPr>
-            <p:cNvPr id="216" name="Screen Shot 2019-10-09 at 12.33.50 PM.png" descr="Screen Shot 2019-10-09 at 12.33.50 PM.png"/>
+            <p:cNvPr id="233" name="Screen Shot 2019-10-09 at 12.33.50 PM.png" descr="Screen Shot 2019-10-09 at 12.33.50 PM.png"/>
             <p:cNvPicPr>
               <a:picLocks noChangeAspect="1"/>
             </p:cNvPicPr>
@@ -5209,7 +5741,7 @@
         </p:pic>
         <p:pic>
           <p:nvPicPr>
-            <p:cNvPr id="217" name="Screen Shot 2019-10-09 at 12.33.43 PM.png" descr="Screen Shot 2019-10-09 at 12.33.43 PM.png"/>
+            <p:cNvPr id="234" name="Screen Shot 2019-10-09 at 12.33.43 PM.png" descr="Screen Shot 2019-10-09 at 12.33.43 PM.png"/>
             <p:cNvPicPr>
               <a:picLocks noChangeAspect="1"/>
             </p:cNvPicPr>
@@ -5242,7 +5774,7 @@
       </p:grpSp>
       <p:sp>
         <p:nvSpPr>
-          <p:cNvPr id="219" name="Outliers"/>
+          <p:cNvPr id="236" name="Outliers"/>
           <p:cNvSpPr txBox="1"/>
           <p:nvPr/>
         </p:nvSpPr>
@@ -5290,7 +5822,7 @@
       </p:sp>
       <p:sp>
         <p:nvSpPr>
-          <p:cNvPr id="220" name="No outliers at the state level…"/>
+          <p:cNvPr id="237" name="No outliers at the state level…"/>
           <p:cNvSpPr txBox="1"/>
           <p:nvPr/>
         </p:nvSpPr>
@@ -5365,7 +5897,7 @@
       </p:sp>
       <p:sp>
         <p:nvSpPr>
-          <p:cNvPr id="221" name="Lowest Quartile"/>
+          <p:cNvPr id="238" name="Lowest Quartile"/>
           <p:cNvSpPr txBox="1"/>
           <p:nvPr/>
         </p:nvSpPr>
@@ -5416,7 +5948,7 @@
       </p:sp>
       <p:sp>
         <p:nvSpPr>
-          <p:cNvPr id="222" name="Highest Quartile"/>
+          <p:cNvPr id="239" name="Highest Quartile"/>
           <p:cNvSpPr txBox="1"/>
           <p:nvPr/>
         </p:nvSpPr>
@@ -5467,7 +5999,7 @@
       </p:sp>
       <p:grpSp>
         <p:nvGrpSpPr>
-          <p:cNvPr id="228" name="Group"/>
+          <p:cNvPr id="245" name="Group"/>
           <p:cNvGrpSpPr/>
           <p:nvPr/>
         </p:nvGrpSpPr>
@@ -5481,7 +6013,7 @@
         </p:grpSpPr>
         <p:pic>
           <p:nvPicPr>
-            <p:cNvPr id="223" name="Screen Shot 2019-10-07 at 5.40.35 PM.png" descr="Screen Shot 2019-10-07 at 5.40.35 PM.png"/>
+            <p:cNvPr id="240" name="Screen Shot 2019-10-07 at 5.40.35 PM.png" descr="Screen Shot 2019-10-07 at 5.40.35 PM.png"/>
             <p:cNvPicPr>
               <a:picLocks noChangeAspect="1"/>
             </p:cNvPicPr>
@@ -5513,7 +6045,7 @@
         </p:pic>
         <p:sp>
           <p:nvSpPr>
-            <p:cNvPr id="224" name="Rectangle"/>
+            <p:cNvPr id="241" name="Rectangle"/>
             <p:cNvSpPr/>
             <p:nvPr/>
           </p:nvSpPr>
@@ -5561,7 +6093,7 @@
         </p:sp>
         <p:sp>
           <p:nvSpPr>
-            <p:cNvPr id="225" name="Rectangle"/>
+            <p:cNvPr id="242" name="Rectangle"/>
             <p:cNvSpPr/>
             <p:nvPr/>
           </p:nvSpPr>
@@ -5609,7 +6141,7 @@
         </p:sp>
         <p:sp>
           <p:nvSpPr>
-            <p:cNvPr id="226" name="Rectangle"/>
+            <p:cNvPr id="243" name="Rectangle"/>
             <p:cNvSpPr/>
             <p:nvPr/>
           </p:nvSpPr>
@@ -5657,7 +6189,7 @@
         </p:sp>
         <p:sp>
           <p:nvSpPr>
-            <p:cNvPr id="227" name="Rectangle"/>
+            <p:cNvPr id="244" name="Rectangle"/>
             <p:cNvSpPr/>
             <p:nvPr/>
           </p:nvSpPr>
@@ -5706,7 +6238,7 @@
       </p:grpSp>
       <p:pic>
         <p:nvPicPr>
-          <p:cNvPr id="229" name="Screen Shot 2019-10-07 at 5.40.46 PM.png" descr="Screen Shot 2019-10-07 at 5.40.46 PM.png"/>
+          <p:cNvPr id="246" name="Screen Shot 2019-10-07 at 5.40.46 PM.png" descr="Screen Shot 2019-10-07 at 5.40.46 PM.png"/>
           <p:cNvPicPr>
             <a:picLocks noChangeAspect="1"/>
           </p:cNvPicPr>
@@ -5736,7 +6268,7 @@
       </p:pic>
       <p:sp>
         <p:nvSpPr>
-          <p:cNvPr id="230" name="Rectangle"/>
+          <p:cNvPr id="247" name="Rectangle"/>
           <p:cNvSpPr/>
           <p:nvPr/>
         </p:nvSpPr>
@@ -5780,7 +6312,7 @@
       </p:sp>
       <p:sp>
         <p:nvSpPr>
-          <p:cNvPr id="231" name="Rectangle"/>
+          <p:cNvPr id="248" name="Rectangle"/>
           <p:cNvSpPr/>
           <p:nvPr/>
         </p:nvSpPr>
@@ -5824,7 +6356,7 @@
       </p:sp>
       <p:sp>
         <p:nvSpPr>
-          <p:cNvPr id="232" name="Rectangle"/>
+          <p:cNvPr id="249" name="Rectangle"/>
           <p:cNvSpPr/>
           <p:nvPr/>
         </p:nvSpPr>
@@ -5868,7 +6400,7 @@
       </p:sp>
       <p:sp>
         <p:nvSpPr>
-          <p:cNvPr id="233" name="Rectangle"/>
+          <p:cNvPr id="250" name="Rectangle"/>
           <p:cNvSpPr/>
           <p:nvPr/>
         </p:nvSpPr>
@@ -5912,7 +6444,7 @@
       </p:sp>
       <p:sp>
         <p:nvSpPr>
-          <p:cNvPr id="234" name="Rectangle"/>
+          <p:cNvPr id="251" name="Rectangle"/>
           <p:cNvSpPr/>
           <p:nvPr/>
         </p:nvSpPr>
@@ -5956,7 +6488,7 @@
       </p:sp>
       <p:pic>
         <p:nvPicPr>
-          <p:cNvPr id="235" name="obesityrates_by_counties.png" descr="obesityrates_by_counties.png"/>
+          <p:cNvPr id="252" name="obesityrates_by_counties.png" descr="obesityrates_by_counties.png"/>
           <p:cNvPicPr>
             <a:picLocks noChangeAspect="1"/>
           </p:cNvPicPr>
@@ -5981,212 +6513,6 @@
           <a:ln w="12700">
             <a:miter lim="400000"/>
           </a:ln>
-        </p:spPr>
-      </p:pic>
-    </p:spTree>
-  </p:cSld>
-  <p:clrMapOvr>
-    <a:masterClrMapping/>
-  </p:clrMapOvr>
-  <p:transition xmlns:p14="http://schemas.microsoft.com/office/powerpoint/2010/main" spd="med" advClick="1"/>
-</p:sld>
-</file>
-
-<file path=ppt/slides/slide15.xml><?xml version="1.0" encoding="utf-8"?>
-<p:sld xmlns:a="http://schemas.openxmlformats.org/drawingml/2006/main" xmlns:r="http://schemas.openxmlformats.org/officeDocument/2006/relationships" xmlns:p="http://schemas.openxmlformats.org/presentationml/2006/main" xmlns:m="http://schemas.openxmlformats.org/officeDocument/2006/math" xmlns:a14="http://schemas.microsoft.com/office/drawing/2010/main" showMasterSp="1" showMasterPhAnim="1">
-  <p:cSld>
-    <p:spTree>
-      <p:nvGrpSpPr>
-        <p:cNvPr id="1" name=""/>
-        <p:cNvGrpSpPr/>
-        <p:nvPr/>
-      </p:nvGrpSpPr>
-      <p:grpSpPr>
-        <a:xfrm>
-          <a:off x="0" y="0"/>
-          <a:ext cx="0" cy="0"/>
-          <a:chOff x="0" y="0"/>
-          <a:chExt cx="0" cy="0"/>
-        </a:xfrm>
-      </p:grpSpPr>
-      <p:sp>
-        <p:nvSpPr>
-          <p:cNvPr id="239" name="Testing within the outliers"/>
-          <p:cNvSpPr txBox="1"/>
-          <p:nvPr/>
-        </p:nvSpPr>
-        <p:spPr>
-          <a:xfrm>
-            <a:off x="516408" y="760232"/>
-            <a:ext cx="11088766" cy="901701"/>
-          </a:xfrm>
-          <a:prstGeom prst="rect">
-            <a:avLst/>
-          </a:prstGeom>
-          <a:solidFill>
-            <a:srgbClr val="FFFFFF"/>
-          </a:solidFill>
-          <a:ln w="12700">
-            <a:miter lim="400000"/>
-          </a:ln>
-          <a:extLst>
-            <a:ext uri="{C572A759-6A51-4108-AA02-DFA0A04FC94B}">
-              <ma14:wrappingTextBoxFlag xmlns:ma14="http://schemas.microsoft.com/office/mac/drawingml/2011/main" val="1"/>
-            </a:ext>
-          </a:extLst>
-        </p:spPr>
-        <p:txBody>
-          <a:bodyPr lIns="50800" tIns="50800" rIns="50800" bIns="50800" anchor="ctr">
-            <a:spAutoFit/>
-          </a:bodyPr>
-          <a:lstStyle>
-            <a:lvl1pPr algn="l">
-              <a:defRPr cap="all" sz="5500">
-                <a:latin typeface="Arial Narrow"/>
-                <a:ea typeface="Arial Narrow"/>
-                <a:cs typeface="Arial Narrow"/>
-                <a:sym typeface="Arial Narrow"/>
-              </a:defRPr>
-            </a:lvl1pPr>
-          </a:lstStyle>
-          <a:p>
-            <a:pPr/>
-            <a:r>
-              <a:t>Testing within the outliers</a:t>
-            </a:r>
-          </a:p>
-        </p:txBody>
-      </p:sp>
-      <p:sp>
-        <p:nvSpPr>
-          <p:cNvPr id="240" name="Within outlier subsets, there was not evidence to support statistical correlation within the tested factors"/>
-          <p:cNvSpPr txBox="1"/>
-          <p:nvPr/>
-        </p:nvSpPr>
-        <p:spPr>
-          <a:xfrm>
-            <a:off x="1363982" y="1938709"/>
-            <a:ext cx="20909835" cy="2015382"/>
-          </a:xfrm>
-          <a:prstGeom prst="rect">
-            <a:avLst/>
-          </a:prstGeom>
-          <a:ln w="76200">
-            <a:solidFill>
-              <a:srgbClr val="FFFFFF">
-                <a:alpha val="66899"/>
-              </a:srgbClr>
-            </a:solidFill>
-            <a:miter lim="400000"/>
-          </a:ln>
-          <a:extLst>
-            <a:ext uri="{C572A759-6A51-4108-AA02-DFA0A04FC94B}">
-              <ma14:wrappingTextBoxFlag xmlns:ma14="http://schemas.microsoft.com/office/mac/drawingml/2011/main" val="1"/>
-            </a:ext>
-          </a:extLst>
-        </p:spPr>
-        <p:txBody>
-          <a:bodyPr lIns="50800" tIns="50800" rIns="50800" bIns="50800" anchor="ctr">
-            <a:spAutoFit/>
-          </a:bodyPr>
-          <a:lstStyle/>
-          <a:p>
-            <a:pPr algn="l">
-              <a:defRPr b="0" sz="4000">
-                <a:latin typeface="Arial Black"/>
-                <a:ea typeface="Arial Black"/>
-                <a:cs typeface="Arial Black"/>
-                <a:sym typeface="Arial Black"/>
-              </a:defRPr>
-            </a:pPr>
-          </a:p>
-          <a:p>
-            <a:pPr marL="529166" indent="-529166" algn="l">
-              <a:buSzPct val="125000"/>
-              <a:buChar char="•"/>
-              <a:defRPr b="0" sz="4000">
-                <a:latin typeface="Arial"/>
-                <a:ea typeface="Arial"/>
-                <a:cs typeface="Arial"/>
-                <a:sym typeface="Arial"/>
-              </a:defRPr>
-            </a:pPr>
-            <a:r>
-              <a:t>Within outlier subsets, there was not evidence to support statistical correlation within the tested factors</a:t>
-            </a:r>
-          </a:p>
-        </p:txBody>
-      </p:sp>
-      <p:pic>
-        <p:nvPicPr>
-          <p:cNvPr id="241" name="Screen Shot 2019-10-09 at 12.49.15 PM.png" descr="Screen Shot 2019-10-09 at 12.49.15 PM.png"/>
-          <p:cNvPicPr>
-            <a:picLocks noChangeAspect="1"/>
-          </p:cNvPicPr>
-          <p:nvPr/>
-        </p:nvPicPr>
-        <p:blipFill>
-          <a:blip r:embed="rId3">
-            <a:extLst/>
-          </a:blip>
-          <a:stretch>
-            <a:fillRect/>
-          </a:stretch>
-        </p:blipFill>
-        <p:spPr>
-          <a:xfrm>
-            <a:off x="12135983" y="5976924"/>
-            <a:ext cx="9676398" cy="3823566"/>
-          </a:xfrm>
-          <a:prstGeom prst="rect">
-            <a:avLst/>
-          </a:prstGeom>
-          <a:ln w="25400">
-            <a:miter lim="400000"/>
-          </a:ln>
-          <a:effectLst>
-            <a:outerShdw sx="100000" sy="100000" kx="0" ky="0" algn="b" rotWithShape="0" blurRad="254000" dist="127000" dir="5400000">
-              <a:srgbClr val="000000">
-                <a:alpha val="70000"/>
-              </a:srgbClr>
-            </a:outerShdw>
-          </a:effectLst>
-        </p:spPr>
-      </p:pic>
-      <p:pic>
-        <p:nvPicPr>
-          <p:cNvPr id="242" name="Screen Shot 2019-10-09 at 12.49.09 PM.png" descr="Screen Shot 2019-10-09 at 12.49.09 PM.png"/>
-          <p:cNvPicPr>
-            <a:picLocks noChangeAspect="1"/>
-          </p:cNvPicPr>
-          <p:nvPr/>
-        </p:nvPicPr>
-        <p:blipFill>
-          <a:blip r:embed="rId4">
-            <a:extLst/>
-          </a:blip>
-          <a:stretch>
-            <a:fillRect/>
-          </a:stretch>
-        </p:blipFill>
-        <p:spPr>
-          <a:xfrm>
-            <a:off x="1825417" y="5976924"/>
-            <a:ext cx="9838165" cy="3823566"/>
-          </a:xfrm>
-          <a:prstGeom prst="rect">
-            <a:avLst/>
-          </a:prstGeom>
-          <a:ln w="25400">
-            <a:miter lim="400000"/>
-          </a:ln>
-          <a:effectLst>
-            <a:outerShdw sx="100000" sy="100000" kx="0" ky="0" algn="b" rotWithShape="0" blurRad="254000" dist="127000" dir="5400000">
-              <a:srgbClr val="000000">
-                <a:alpha val="70000"/>
-              </a:srgbClr>
-            </a:outerShdw>
-          </a:effectLst>
         </p:spPr>
       </p:pic>
     </p:spTree>
@@ -6215,45 +6541,16 @@
           <a:chExt cx="0" cy="0"/>
         </a:xfrm>
       </p:grpSpPr>
-      <p:pic>
-        <p:nvPicPr>
-          <p:cNvPr id="246" name="Image" descr="Image"/>
-          <p:cNvPicPr>
-            <a:picLocks noChangeAspect="1"/>
-          </p:cNvPicPr>
-          <p:nvPr/>
-        </p:nvPicPr>
-        <p:blipFill>
-          <a:blip r:embed="rId2">
-            <a:extLst/>
-          </a:blip>
-          <a:stretch>
-            <a:fillRect/>
-          </a:stretch>
-        </p:blipFill>
-        <p:spPr>
-          <a:xfrm>
-            <a:off x="96287" y="-5886297"/>
-            <a:ext cx="24531131" cy="24531131"/>
-          </a:xfrm>
-          <a:prstGeom prst="rect">
-            <a:avLst/>
-          </a:prstGeom>
-          <a:ln w="12700">
-            <a:miter lim="400000"/>
-          </a:ln>
-        </p:spPr>
-      </p:pic>
       <p:sp>
         <p:nvSpPr>
-          <p:cNvPr id="247" name="Conclusion"/>
+          <p:cNvPr id="256" name="Testing within the County outliers"/>
           <p:cNvSpPr txBox="1"/>
           <p:nvPr/>
         </p:nvSpPr>
         <p:spPr>
           <a:xfrm>
-            <a:off x="9677152" y="6311899"/>
-            <a:ext cx="5369401" cy="1854201"/>
+            <a:off x="516408" y="760232"/>
+            <a:ext cx="12932778" cy="901701"/>
           </a:xfrm>
           <a:prstGeom prst="rect">
             <a:avLst/>
@@ -6275,8 +6572,8 @@
             <a:spAutoFit/>
           </a:bodyPr>
           <a:lstStyle>
-            <a:lvl1pPr>
-              <a:defRPr cap="all" sz="6000">
+            <a:lvl1pPr algn="l">
+              <a:defRPr cap="all" sz="5500">
                 <a:latin typeface="Arial Narrow"/>
                 <a:ea typeface="Arial Narrow"/>
                 <a:cs typeface="Arial Narrow"/>
@@ -6287,50 +6584,143 @@
           <a:p>
             <a:pPr/>
             <a:r>
-              <a:t>Conclusion</a:t>
+              <a:t>Testing within the County outliers</a:t>
             </a:r>
           </a:p>
         </p:txBody>
       </p:sp>
       <p:sp>
         <p:nvSpPr>
-          <p:cNvPr id="248" name="Rectangle"/>
-          <p:cNvSpPr/>
+          <p:cNvPr id="257" name="Within outlier subsets, there was not evidence to support statistical correlation within the tested factors"/>
+          <p:cNvSpPr txBox="1"/>
           <p:nvPr/>
         </p:nvSpPr>
         <p:spPr>
           <a:xfrm>
-            <a:off x="9707700" y="6223000"/>
-            <a:ext cx="5308305" cy="1270000"/>
+            <a:off x="1363982" y="1938709"/>
+            <a:ext cx="20909835" cy="2015382"/>
           </a:xfrm>
           <a:prstGeom prst="rect">
             <a:avLst/>
           </a:prstGeom>
           <a:ln w="76200">
             <a:solidFill>
-              <a:srgbClr val="5E5E5E"/>
+              <a:srgbClr val="FFFFFF">
+                <a:alpha val="66899"/>
+              </a:srgbClr>
             </a:solidFill>
             <a:miter lim="400000"/>
           </a:ln>
+          <a:extLst>
+            <a:ext uri="{C572A759-6A51-4108-AA02-DFA0A04FC94B}">
+              <ma14:wrappingTextBoxFlag xmlns:ma14="http://schemas.microsoft.com/office/mac/drawingml/2011/main" val="1"/>
+            </a:ext>
+          </a:extLst>
         </p:spPr>
         <p:txBody>
-          <a:bodyPr lIns="0" tIns="0" rIns="0" bIns="0" anchor="ctr"/>
+          <a:bodyPr lIns="50800" tIns="50800" rIns="50800" bIns="50800" anchor="ctr">
+            <a:spAutoFit/>
+          </a:bodyPr>
           <a:lstStyle/>
           <a:p>
-            <a:pPr>
-              <a:defRPr b="0" sz="3200">
-                <a:solidFill>
-                  <a:srgbClr val="FFFFFF"/>
-                </a:solidFill>
-                <a:latin typeface="+mn-lt"/>
-                <a:ea typeface="+mn-ea"/>
-                <a:cs typeface="+mn-cs"/>
-                <a:sym typeface="Helvetica Neue Medium"/>
+            <a:pPr algn="l">
+              <a:defRPr b="0" sz="4000">
+                <a:latin typeface="Arial Black"/>
+                <a:ea typeface="Arial Black"/>
+                <a:cs typeface="Arial Black"/>
+                <a:sym typeface="Arial Black"/>
               </a:defRPr>
             </a:pPr>
           </a:p>
+          <a:p>
+            <a:pPr marL="529166" indent="-529166" algn="l">
+              <a:buSzPct val="125000"/>
+              <a:buChar char="•"/>
+              <a:defRPr b="0" sz="4000">
+                <a:latin typeface="Arial"/>
+                <a:ea typeface="Arial"/>
+                <a:cs typeface="Arial"/>
+                <a:sym typeface="Arial"/>
+              </a:defRPr>
+            </a:pPr>
+            <a:r>
+              <a:t>Within outlier subsets, there was not evidence to support statistical correlation within the tested factors</a:t>
+            </a:r>
+          </a:p>
         </p:txBody>
       </p:sp>
+      <p:pic>
+        <p:nvPicPr>
+          <p:cNvPr id="258" name="Screen Shot 2019-10-09 at 12.49.15 PM.png" descr="Screen Shot 2019-10-09 at 12.49.15 PM.png"/>
+          <p:cNvPicPr>
+            <a:picLocks noChangeAspect="1"/>
+          </p:cNvPicPr>
+          <p:nvPr/>
+        </p:nvPicPr>
+        <p:blipFill>
+          <a:blip r:embed="rId3">
+            <a:extLst/>
+          </a:blip>
+          <a:stretch>
+            <a:fillRect/>
+          </a:stretch>
+        </p:blipFill>
+        <p:spPr>
+          <a:xfrm>
+            <a:off x="12135983" y="5976924"/>
+            <a:ext cx="9676398" cy="3823566"/>
+          </a:xfrm>
+          <a:prstGeom prst="rect">
+            <a:avLst/>
+          </a:prstGeom>
+          <a:ln w="25400">
+            <a:miter lim="400000"/>
+          </a:ln>
+          <a:effectLst>
+            <a:outerShdw sx="100000" sy="100000" kx="0" ky="0" algn="b" rotWithShape="0" blurRad="254000" dist="127000" dir="5400000">
+              <a:srgbClr val="000000">
+                <a:alpha val="70000"/>
+              </a:srgbClr>
+            </a:outerShdw>
+          </a:effectLst>
+        </p:spPr>
+      </p:pic>
+      <p:pic>
+        <p:nvPicPr>
+          <p:cNvPr id="259" name="Screen Shot 2019-10-09 at 12.49.09 PM.png" descr="Screen Shot 2019-10-09 at 12.49.09 PM.png"/>
+          <p:cNvPicPr>
+            <a:picLocks noChangeAspect="1"/>
+          </p:cNvPicPr>
+          <p:nvPr/>
+        </p:nvPicPr>
+        <p:blipFill>
+          <a:blip r:embed="rId4">
+            <a:extLst/>
+          </a:blip>
+          <a:stretch>
+            <a:fillRect/>
+          </a:stretch>
+        </p:blipFill>
+        <p:spPr>
+          <a:xfrm>
+            <a:off x="1825417" y="5976924"/>
+            <a:ext cx="9838165" cy="3823566"/>
+          </a:xfrm>
+          <a:prstGeom prst="rect">
+            <a:avLst/>
+          </a:prstGeom>
+          <a:ln w="25400">
+            <a:miter lim="400000"/>
+          </a:ln>
+          <a:effectLst>
+            <a:outerShdw sx="100000" sy="100000" kx="0" ky="0" algn="b" rotWithShape="0" blurRad="254000" dist="127000" dir="5400000">
+              <a:srgbClr val="000000">
+                <a:alpha val="70000"/>
+              </a:srgbClr>
+            </a:outerShdw>
+          </a:effectLst>
+        </p:spPr>
+      </p:pic>
     </p:spTree>
   </p:cSld>
   <p:clrMapOvr>
@@ -6357,16 +6747,45 @@
           <a:chExt cx="0" cy="0"/>
         </a:xfrm>
       </p:grpSpPr>
+      <p:pic>
+        <p:nvPicPr>
+          <p:cNvPr id="263" name="Image" descr="Image"/>
+          <p:cNvPicPr>
+            <a:picLocks noChangeAspect="1"/>
+          </p:cNvPicPr>
+          <p:nvPr/>
+        </p:nvPicPr>
+        <p:blipFill>
+          <a:blip r:embed="rId2">
+            <a:extLst/>
+          </a:blip>
+          <a:stretch>
+            <a:fillRect/>
+          </a:stretch>
+        </p:blipFill>
+        <p:spPr>
+          <a:xfrm>
+            <a:off x="96287" y="-5886297"/>
+            <a:ext cx="24531131" cy="24531131"/>
+          </a:xfrm>
+          <a:prstGeom prst="rect">
+            <a:avLst/>
+          </a:prstGeom>
+          <a:ln w="12700">
+            <a:miter lim="400000"/>
+          </a:ln>
+        </p:spPr>
+      </p:pic>
       <p:sp>
         <p:nvSpPr>
-          <p:cNvPr id="250" name="Data Limitations"/>
+          <p:cNvPr id="264" name="Conclusion"/>
           <p:cNvSpPr txBox="1"/>
           <p:nvPr/>
         </p:nvSpPr>
         <p:spPr>
           <a:xfrm>
-            <a:off x="516408" y="760232"/>
-            <a:ext cx="11088766" cy="901701"/>
+            <a:off x="9677152" y="6311899"/>
+            <a:ext cx="5369401" cy="1854201"/>
           </a:xfrm>
           <a:prstGeom prst="rect">
             <a:avLst/>
@@ -6388,8 +6807,8 @@
             <a:spAutoFit/>
           </a:bodyPr>
           <a:lstStyle>
-            <a:lvl1pPr algn="l">
-              <a:defRPr cap="all" sz="5500">
+            <a:lvl1pPr>
+              <a:defRPr cap="all" sz="6000">
                 <a:latin typeface="Arial Narrow"/>
                 <a:ea typeface="Arial Narrow"/>
                 <a:cs typeface="Arial Narrow"/>
@@ -6400,179 +6819,50 @@
           <a:p>
             <a:pPr/>
             <a:r>
-              <a:t>Data Limitations</a:t>
+              <a:t>Conclusion</a:t>
             </a:r>
           </a:p>
         </p:txBody>
       </p:sp>
       <p:sp>
         <p:nvSpPr>
-          <p:cNvPr id="251" name="Incomplete data sets limited our analysis from factors such as income range, gender, age, etc, which led us to data that included only health risk factors in a one-year range…"/>
-          <p:cNvSpPr txBox="1"/>
+          <p:cNvPr id="265" name="Rectangle"/>
+          <p:cNvSpPr/>
           <p:nvPr/>
         </p:nvSpPr>
         <p:spPr>
           <a:xfrm>
-            <a:off x="1468885" y="1815777"/>
-            <a:ext cx="20909835" cy="3729881"/>
+            <a:off x="9707700" y="6223000"/>
+            <a:ext cx="5308305" cy="1270000"/>
           </a:xfrm>
           <a:prstGeom prst="rect">
             <a:avLst/>
           </a:prstGeom>
           <a:ln w="76200">
             <a:solidFill>
-              <a:srgbClr val="FFFFFF">
-                <a:alpha val="66899"/>
-              </a:srgbClr>
+              <a:srgbClr val="5E5E5E"/>
             </a:solidFill>
             <a:miter lim="400000"/>
           </a:ln>
-          <a:extLst>
-            <a:ext uri="{C572A759-6A51-4108-AA02-DFA0A04FC94B}">
-              <ma14:wrappingTextBoxFlag xmlns:ma14="http://schemas.microsoft.com/office/mac/drawingml/2011/main" val="1"/>
-            </a:ext>
-          </a:extLst>
         </p:spPr>
         <p:txBody>
-          <a:bodyPr lIns="50800" tIns="50800" rIns="50800" bIns="50800" anchor="ctr">
-            <a:spAutoFit/>
-          </a:bodyPr>
+          <a:bodyPr lIns="0" tIns="0" rIns="0" bIns="0" anchor="ctr"/>
           <a:lstStyle/>
           <a:p>
-            <a:pPr algn="l">
-              <a:defRPr b="0" sz="4000">
-                <a:latin typeface="Arial Black"/>
-                <a:ea typeface="Arial Black"/>
-                <a:cs typeface="Arial Black"/>
-                <a:sym typeface="Arial Black"/>
+            <a:pPr>
+              <a:defRPr b="0" sz="3200">
+                <a:solidFill>
+                  <a:srgbClr val="FFFFFF"/>
+                </a:solidFill>
+                <a:latin typeface="+mn-lt"/>
+                <a:ea typeface="+mn-ea"/>
+                <a:cs typeface="+mn-cs"/>
+                <a:sym typeface="Helvetica Neue Medium"/>
               </a:defRPr>
             </a:pPr>
           </a:p>
-          <a:p>
-            <a:pPr marL="529166" indent="-529166" algn="l">
-              <a:buSzPct val="125000"/>
-              <a:buChar char="•"/>
-              <a:defRPr b="0" sz="4000">
-                <a:latin typeface="Arial"/>
-                <a:ea typeface="Arial"/>
-                <a:cs typeface="Arial"/>
-                <a:sym typeface="Arial"/>
-              </a:defRPr>
-            </a:pPr>
-            <a:r>
-              <a:t>Incomplete data sets limited our analysis from factors such as income range, gender, age, etc, which led us to data that included only health risk factors in a one-year range</a:t>
-            </a:r>
-          </a:p>
-          <a:p>
-            <a:pPr marL="529166" indent="-529166" algn="l">
-              <a:buSzPct val="125000"/>
-              <a:buChar char="•"/>
-              <a:defRPr b="0" sz="4000">
-                <a:latin typeface="Arial"/>
-                <a:ea typeface="Arial"/>
-                <a:cs typeface="Arial"/>
-                <a:sym typeface="Arial"/>
-              </a:defRPr>
-            </a:pPr>
-            <a:r>
-              <a:t>Obesity data at county level, but weather data was not</a:t>
-            </a:r>
-          </a:p>
-          <a:p>
-            <a:pPr marL="529166" indent="-529166" algn="l">
-              <a:buSzPct val="125000"/>
-              <a:buChar char="•"/>
-              <a:defRPr b="0" sz="4000">
-                <a:latin typeface="Arial"/>
-                <a:ea typeface="Arial"/>
-                <a:cs typeface="Arial"/>
-                <a:sym typeface="Arial"/>
-              </a:defRPr>
-            </a:pPr>
-            <a:r>
-              <a:t>Select county data had “1111.1” meaning that there was missing reports</a:t>
-            </a:r>
-          </a:p>
         </p:txBody>
       </p:sp>
-      <p:pic>
-        <p:nvPicPr>
-          <p:cNvPr id="252" name="Screen Shot 2019-10-07 at 9.06.47 PM.png" descr="Screen Shot 2019-10-07 at 9.06.47 PM.png"/>
-          <p:cNvPicPr>
-            <a:picLocks noChangeAspect="1"/>
-          </p:cNvPicPr>
-          <p:nvPr/>
-        </p:nvPicPr>
-        <p:blipFill>
-          <a:blip r:embed="rId3">
-            <a:extLst/>
-          </a:blip>
-          <a:stretch>
-            <a:fillRect/>
-          </a:stretch>
-        </p:blipFill>
-        <p:spPr>
-          <a:xfrm>
-            <a:off x="4198728" y="10491664"/>
-            <a:ext cx="16563508" cy="2205202"/>
-          </a:xfrm>
-          <a:prstGeom prst="rect">
-            <a:avLst/>
-          </a:prstGeom>
-          <a:ln w="25400">
-            <a:solidFill>
-              <a:srgbClr val="F3F7F5"/>
-            </a:solidFill>
-            <a:miter lim="400000"/>
-          </a:ln>
-          <a:effectLst>
-            <a:outerShdw sx="100000" sy="100000" kx="0" ky="0" algn="b" rotWithShape="0" blurRad="50800" dist="25400" dir="3600000">
-              <a:srgbClr val="000000">
-                <a:alpha val="70000"/>
-              </a:srgbClr>
-            </a:outerShdw>
-          </a:effectLst>
-        </p:spPr>
-      </p:pic>
-      <p:pic>
-        <p:nvPicPr>
-          <p:cNvPr id="253" name="Screen Shot 2019-10-07 at 9.08.02 PM.png" descr="Screen Shot 2019-10-07 at 9.08.02 PM.png"/>
-          <p:cNvPicPr>
-            <a:picLocks noChangeAspect="1"/>
-          </p:cNvPicPr>
-          <p:nvPr/>
-        </p:nvPicPr>
-        <p:blipFill>
-          <a:blip r:embed="rId4">
-            <a:extLst/>
-          </a:blip>
-          <a:stretch>
-            <a:fillRect/>
-          </a:stretch>
-        </p:blipFill>
-        <p:spPr>
-          <a:xfrm>
-            <a:off x="9354451" y="7136403"/>
-            <a:ext cx="6252061" cy="2424270"/>
-          </a:xfrm>
-          <a:prstGeom prst="rect">
-            <a:avLst/>
-          </a:prstGeom>
-          <a:ln w="25400">
-            <a:solidFill>
-              <a:srgbClr val="F3F7F5"/>
-            </a:solidFill>
-            <a:miter lim="400000"/>
-          </a:ln>
-          <a:effectLst>
-            <a:outerShdw sx="100000" sy="100000" kx="0" ky="0" algn="b" rotWithShape="0" blurRad="50800" dist="25400" dir="3600000">
-              <a:srgbClr val="000000">
-                <a:alpha val="70000"/>
-              </a:srgbClr>
-            </a:outerShdw>
-          </a:effectLst>
-        </p:spPr>
-      </p:pic>
     </p:spTree>
   </p:cSld>
   <p:clrMapOvr>
@@ -6601,14 +6891,14 @@
       </p:grpSpPr>
       <p:sp>
         <p:nvSpPr>
-          <p:cNvPr id="257" name="Conclusion"/>
+          <p:cNvPr id="267" name="Data Limitations"/>
           <p:cNvSpPr txBox="1"/>
           <p:nvPr/>
         </p:nvSpPr>
         <p:spPr>
           <a:xfrm>
             <a:off x="516408" y="760232"/>
-            <a:ext cx="13512482" cy="901701"/>
+            <a:ext cx="11088766" cy="901701"/>
           </a:xfrm>
           <a:prstGeom prst="rect">
             <a:avLst/>
@@ -6642,21 +6932,21 @@
           <a:p>
             <a:pPr/>
             <a:r>
-              <a:t>Conclusion</a:t>
+              <a:t>Data Limitations</a:t>
             </a:r>
           </a:p>
         </p:txBody>
       </p:sp>
       <p:sp>
         <p:nvSpPr>
-          <p:cNvPr id="258" name="We failed to reject the null hypothesis, meaning that there is no significant relationship between obesity and the state temperature, with a pvalue of 2.6714108531690735e-75"/>
+          <p:cNvPr id="268" name="Incomplete data sets limited our analysis from factors such as income range, gender, age, etc, which led us to data that included only health risk factors in a one-year range…"/>
           <p:cNvSpPr txBox="1"/>
           <p:nvPr/>
         </p:nvSpPr>
         <p:spPr>
           <a:xfrm>
-            <a:off x="1363982" y="2070663"/>
-            <a:ext cx="20909835" cy="2015382"/>
+            <a:off x="1468885" y="1815777"/>
+            <a:ext cx="20909835" cy="3729881"/>
           </a:xfrm>
           <a:prstGeom prst="rect">
             <a:avLst/>
@@ -6691,7 +6981,9 @@
             </a:pPr>
           </a:p>
           <a:p>
-            <a:pPr algn="l">
+            <a:pPr marL="529166" indent="-529166" algn="l">
+              <a:buSzPct val="125000"/>
+              <a:buChar char="•"/>
               <a:defRPr b="0" sz="4000">
                 <a:latin typeface="Arial"/>
                 <a:ea typeface="Arial"/>
@@ -6700,11 +6992,119 @@
               </a:defRPr>
             </a:pPr>
             <a:r>
-              <a:t>We failed to reject the null hypothesis, meaning that there is no significant relationship between obesity and the state temperature, with a pvalue of 2.6714108531690735e-75</a:t>
+              <a:t>Incomplete data sets limited our analysis from factors such as income range, gender, age, etc, which led us to data that included only health risk factors in a one-year range</a:t>
+            </a:r>
+          </a:p>
+          <a:p>
+            <a:pPr marL="529166" indent="-529166" algn="l">
+              <a:buSzPct val="125000"/>
+              <a:buChar char="•"/>
+              <a:defRPr b="0" sz="4000">
+                <a:latin typeface="Arial"/>
+                <a:ea typeface="Arial"/>
+                <a:cs typeface="Arial"/>
+                <a:sym typeface="Arial"/>
+              </a:defRPr>
+            </a:pPr>
+            <a:r>
+              <a:t>Obesity data at county level, but weather data was not</a:t>
+            </a:r>
+          </a:p>
+          <a:p>
+            <a:pPr marL="529166" indent="-529166" algn="l">
+              <a:buSzPct val="125000"/>
+              <a:buChar char="•"/>
+              <a:defRPr b="0" sz="4000">
+                <a:latin typeface="Arial"/>
+                <a:ea typeface="Arial"/>
+                <a:cs typeface="Arial"/>
+                <a:sym typeface="Arial"/>
+              </a:defRPr>
+            </a:pPr>
+            <a:r>
+              <a:t>Select county data had “1111.1” meaning that there was missing reports</a:t>
             </a:r>
           </a:p>
         </p:txBody>
       </p:sp>
+      <p:pic>
+        <p:nvPicPr>
+          <p:cNvPr id="269" name="Screen Shot 2019-10-07 at 9.06.47 PM.png" descr="Screen Shot 2019-10-07 at 9.06.47 PM.png"/>
+          <p:cNvPicPr>
+            <a:picLocks noChangeAspect="1"/>
+          </p:cNvPicPr>
+          <p:nvPr/>
+        </p:nvPicPr>
+        <p:blipFill>
+          <a:blip r:embed="rId3">
+            <a:extLst/>
+          </a:blip>
+          <a:stretch>
+            <a:fillRect/>
+          </a:stretch>
+        </p:blipFill>
+        <p:spPr>
+          <a:xfrm>
+            <a:off x="4198728" y="10491664"/>
+            <a:ext cx="16563508" cy="2205202"/>
+          </a:xfrm>
+          <a:prstGeom prst="rect">
+            <a:avLst/>
+          </a:prstGeom>
+          <a:ln w="25400">
+            <a:solidFill>
+              <a:srgbClr val="F3F7F5"/>
+            </a:solidFill>
+            <a:miter lim="400000"/>
+          </a:ln>
+          <a:effectLst>
+            <a:outerShdw sx="100000" sy="100000" kx="0" ky="0" algn="b" rotWithShape="0" blurRad="50800" dist="25400" dir="3600000">
+              <a:srgbClr val="000000">
+                <a:alpha val="70000"/>
+              </a:srgbClr>
+            </a:outerShdw>
+          </a:effectLst>
+        </p:spPr>
+      </p:pic>
+      <p:pic>
+        <p:nvPicPr>
+          <p:cNvPr id="270" name="Screen Shot 2019-10-07 at 9.08.02 PM.png" descr="Screen Shot 2019-10-07 at 9.08.02 PM.png"/>
+          <p:cNvPicPr>
+            <a:picLocks noChangeAspect="1"/>
+          </p:cNvPicPr>
+          <p:nvPr/>
+        </p:nvPicPr>
+        <p:blipFill>
+          <a:blip r:embed="rId4">
+            <a:extLst/>
+          </a:blip>
+          <a:stretch>
+            <a:fillRect/>
+          </a:stretch>
+        </p:blipFill>
+        <p:spPr>
+          <a:xfrm>
+            <a:off x="9354451" y="7136403"/>
+            <a:ext cx="6252061" cy="2424270"/>
+          </a:xfrm>
+          <a:prstGeom prst="rect">
+            <a:avLst/>
+          </a:prstGeom>
+          <a:ln w="25400">
+            <a:solidFill>
+              <a:srgbClr val="F3F7F5"/>
+            </a:solidFill>
+            <a:miter lim="400000"/>
+          </a:ln>
+          <a:effectLst>
+            <a:outerShdw sx="100000" sy="100000" kx="0" ky="0" algn="b" rotWithShape="0" blurRad="50800" dist="25400" dir="3600000">
+              <a:srgbClr val="000000">
+                <a:alpha val="70000"/>
+              </a:srgbClr>
+            </a:outerShdw>
+          </a:effectLst>
+        </p:spPr>
+      </p:pic>
     </p:spTree>
   </p:cSld>
   <p:clrMapOvr>
@@ -6733,7 +7133,7 @@
       </p:grpSpPr>
       <p:sp>
         <p:nvSpPr>
-          <p:cNvPr id="262" name="Further Scope"/>
+          <p:cNvPr id="274" name="Conclusion"/>
           <p:cNvSpPr txBox="1"/>
           <p:nvPr/>
         </p:nvSpPr>
@@ -6774,21 +7174,21 @@
           <a:p>
             <a:pPr/>
             <a:r>
-              <a:t>Further Scope</a:t>
+              <a:t>Conclusion</a:t>
             </a:r>
           </a:p>
         </p:txBody>
       </p:sp>
       <p:sp>
         <p:nvSpPr>
-          <p:cNvPr id="263" name="Multi-variant analysis such as polynomial regressions on factors such as income level, demographic, education, ethnicity, distance to fast food restaurants (KFC), co-morbidity or autoimmune disorders such as thyroid and fatty liver disease"/>
+          <p:cNvPr id="275" name="We failed to reject the null hypothesis, meaning that there is no significant relationship between obesity and the state temperature, with a pvalue of 2.6714108531690735e-75"/>
           <p:cNvSpPr txBox="1"/>
           <p:nvPr/>
         </p:nvSpPr>
         <p:spPr>
           <a:xfrm>
-            <a:off x="1363982" y="1784913"/>
-            <a:ext cx="20909835" cy="2586882"/>
+            <a:off x="1363982" y="2070663"/>
+            <a:ext cx="20909835" cy="2015382"/>
           </a:xfrm>
           <a:prstGeom prst="rect">
             <a:avLst/>
@@ -6832,7 +7232,7 @@
               </a:defRPr>
             </a:pPr>
             <a:r>
-              <a:t>Multi-variant analysis such as polynomial regressions on factors such as income level, demographic, education, ethnicity, distance to fast food restaurants (KFC), co-morbidity or autoimmune disorders such as thyroid and fatty liver disease </a:t>
+              <a:t>We failed to reject the null hypothesis, meaning that there is no significant relationship between obesity and the state temperature, with a pvalue of 2.6714108531690735e-75</a:t>
             </a:r>
           </a:p>
         </p:txBody>
@@ -7305,9 +7705,141 @@
           <a:chExt cx="0" cy="0"/>
         </a:xfrm>
       </p:grpSpPr>
+      <p:sp>
+        <p:nvSpPr>
+          <p:cNvPr id="279" name="Further Scope"/>
+          <p:cNvSpPr txBox="1"/>
+          <p:nvPr/>
+        </p:nvSpPr>
+        <p:spPr>
+          <a:xfrm>
+            <a:off x="516408" y="760232"/>
+            <a:ext cx="13512482" cy="901701"/>
+          </a:xfrm>
+          <a:prstGeom prst="rect">
+            <a:avLst/>
+          </a:prstGeom>
+          <a:solidFill>
+            <a:srgbClr val="FFFFFF"/>
+          </a:solidFill>
+          <a:ln w="12700">
+            <a:miter lim="400000"/>
+          </a:ln>
+          <a:extLst>
+            <a:ext uri="{C572A759-6A51-4108-AA02-DFA0A04FC94B}">
+              <ma14:wrappingTextBoxFlag xmlns:ma14="http://schemas.microsoft.com/office/mac/drawingml/2011/main" val="1"/>
+            </a:ext>
+          </a:extLst>
+        </p:spPr>
+        <p:txBody>
+          <a:bodyPr lIns="50800" tIns="50800" rIns="50800" bIns="50800" anchor="ctr">
+            <a:spAutoFit/>
+          </a:bodyPr>
+          <a:lstStyle>
+            <a:lvl1pPr algn="l">
+              <a:defRPr cap="all" sz="5500">
+                <a:latin typeface="Arial Narrow"/>
+                <a:ea typeface="Arial Narrow"/>
+                <a:cs typeface="Arial Narrow"/>
+                <a:sym typeface="Arial Narrow"/>
+              </a:defRPr>
+            </a:lvl1pPr>
+          </a:lstStyle>
+          <a:p>
+            <a:pPr/>
+            <a:r>
+              <a:t>Further Scope</a:t>
+            </a:r>
+          </a:p>
+        </p:txBody>
+      </p:sp>
+      <p:sp>
+        <p:nvSpPr>
+          <p:cNvPr id="280" name="Multi-variant analysis such as polynomial regressions on factors such as income level, demographic, education, ethnicity, distance to fast food restaurants (KFC), co-morbidity or autoimmune disorders such as thyroid and fatty liver disease"/>
+          <p:cNvSpPr txBox="1"/>
+          <p:nvPr/>
+        </p:nvSpPr>
+        <p:spPr>
+          <a:xfrm>
+            <a:off x="1363982" y="1784913"/>
+            <a:ext cx="20909835" cy="2586882"/>
+          </a:xfrm>
+          <a:prstGeom prst="rect">
+            <a:avLst/>
+          </a:prstGeom>
+          <a:ln w="76200">
+            <a:solidFill>
+              <a:srgbClr val="FFFFFF">
+                <a:alpha val="66899"/>
+              </a:srgbClr>
+            </a:solidFill>
+            <a:miter lim="400000"/>
+          </a:ln>
+          <a:extLst>
+            <a:ext uri="{C572A759-6A51-4108-AA02-DFA0A04FC94B}">
+              <ma14:wrappingTextBoxFlag xmlns:ma14="http://schemas.microsoft.com/office/mac/drawingml/2011/main" val="1"/>
+            </a:ext>
+          </a:extLst>
+        </p:spPr>
+        <p:txBody>
+          <a:bodyPr lIns="50800" tIns="50800" rIns="50800" bIns="50800" anchor="ctr">
+            <a:spAutoFit/>
+          </a:bodyPr>
+          <a:lstStyle/>
+          <a:p>
+            <a:pPr algn="l">
+              <a:defRPr b="0" sz="4000">
+                <a:latin typeface="Arial Black"/>
+                <a:ea typeface="Arial Black"/>
+                <a:cs typeface="Arial Black"/>
+                <a:sym typeface="Arial Black"/>
+              </a:defRPr>
+            </a:pPr>
+          </a:p>
+          <a:p>
+            <a:pPr algn="l">
+              <a:defRPr b="0" sz="4000">
+                <a:latin typeface="Arial"/>
+                <a:ea typeface="Arial"/>
+                <a:cs typeface="Arial"/>
+                <a:sym typeface="Arial"/>
+              </a:defRPr>
+            </a:pPr>
+            <a:r>
+              <a:t>Multi-variant analysis such as polynomial regressions on factors such as income level, demographic, education, ethnicity, distance to fast food restaurants (KFC), co-morbidity or autoimmune disorders such as thyroid and fatty liver disease </a:t>
+            </a:r>
+          </a:p>
+        </p:txBody>
+      </p:sp>
+    </p:spTree>
+  </p:cSld>
+  <p:clrMapOvr>
+    <a:masterClrMapping/>
+  </p:clrMapOvr>
+  <p:transition xmlns:p14="http://schemas.microsoft.com/office/powerpoint/2010/main" spd="med" advClick="1"/>
+</p:sld>
+</file>
+
+<file path=ppt/slides/slide21.xml><?xml version="1.0" encoding="utf-8"?>
+<p:sld xmlns:a="http://schemas.openxmlformats.org/drawingml/2006/main" xmlns:r="http://schemas.openxmlformats.org/officeDocument/2006/relationships" xmlns:p="http://schemas.openxmlformats.org/presentationml/2006/main" xmlns:m="http://schemas.openxmlformats.org/officeDocument/2006/math" xmlns:a14="http://schemas.microsoft.com/office/drawing/2010/main" showMasterSp="1" showMasterPhAnim="1">
+  <p:cSld>
+    <p:spTree>
+      <p:nvGrpSpPr>
+        <p:cNvPr id="1" name=""/>
+        <p:cNvGrpSpPr/>
+        <p:nvPr/>
+      </p:nvGrpSpPr>
+      <p:grpSpPr>
+        <a:xfrm>
+          <a:off x="0" y="0"/>
+          <a:ext cx="0" cy="0"/>
+          <a:chOff x="0" y="0"/>
+          <a:chExt cx="0" cy="0"/>
+        </a:xfrm>
+      </p:grpSpPr>
       <p:pic>
         <p:nvPicPr>
-          <p:cNvPr id="267" name="Image" descr="Image"/>
+          <p:cNvPr id="284" name="Image" descr="Image"/>
           <p:cNvPicPr>
             <a:picLocks noChangeAspect="1"/>
           </p:cNvPicPr>
@@ -7336,7 +7868,7 @@
       </p:pic>
       <p:sp>
         <p:nvSpPr>
-          <p:cNvPr id="268" name="Thank you!"/>
+          <p:cNvPr id="285" name="Thank you!"/>
           <p:cNvSpPr txBox="1"/>
           <p:nvPr/>
         </p:nvSpPr>
@@ -7384,7 +7916,7 @@
       </p:sp>
       <p:sp>
         <p:nvSpPr>
-          <p:cNvPr id="269" name="Rectangle"/>
+          <p:cNvPr id="286" name="Rectangle"/>
           <p:cNvSpPr/>
           <p:nvPr/>
         </p:nvSpPr>
@@ -7460,7 +7992,7 @@
                                       <p:cBhvr>
                                         <p:cTn id="6" fill="hold"/>
                                         <p:tgtEl>
-                                          <p:spTgt spid="269"/>
+                                          <p:spTgt spid="286"/>
                                         </p:tgtEl>
                                         <p:attrNameLst>
                                           <p:attrName>style.visibility</p:attrName>
@@ -7474,7 +8006,7 @@
                                       <p:cBhvr>
                                         <p:cTn id="7" dur="2500"/>
                                         <p:tgtEl>
-                                          <p:spTgt spid="269"/>
+                                          <p:spTgt spid="286"/>
                                         </p:tgtEl>
                                       </p:cBhvr>
                                     </p:animEffect>
@@ -7509,7 +8041,7 @@
       </p:par>
     </p:tnLst>
     <p:bldLst>
-      <p:bldP build="whole" bldLvl="1" animBg="1" rev="0" advAuto="0" spid="269" grpId="1"/>
+      <p:bldP build="whole" bldLvl="1" animBg="1" rev="0" advAuto="0" spid="286" grpId="1"/>
     </p:bldLst>
   </p:timing>
 </p:sld>
@@ -7964,8 +8496,8 @@
       </p:par>
     </p:tnLst>
     <p:bldLst>
+      <p:bldP build="whole" bldLvl="1" animBg="1" rev="0" advAuto="0" spid="147" grpId="2"/>
       <p:bldP build="whole" bldLvl="1" animBg="1" rev="0" advAuto="0" spid="144" grpId="1"/>
-      <p:bldP build="whole" bldLvl="1" animBg="1" rev="0" advAuto="0" spid="147" grpId="2"/>
     </p:bldLst>
   </p:timing>
 </p:sld>

</xml_diff>